<commit_message>
Added comments, more content to ppt
</commit_message>
<xml_diff>
--- a/Kő papír olló.pptx
+++ b/Kő papír olló.pptx
@@ -7,7 +7,7 @@
   <p:sldIdLst>
     <p:sldId id="256" r:id="rId2"/>
     <p:sldId id="257" r:id="rId3"/>
-    <p:sldId id="259" r:id="rId4"/>
+    <p:sldId id="266" r:id="rId4"/>
     <p:sldId id="258" r:id="rId5"/>
     <p:sldId id="260" r:id="rId6"/>
     <p:sldId id="261" r:id="rId7"/>
@@ -113,6 +113,11 @@
       </a:defRPr>
     </a:lvl9pPr>
   </p:defaultTextStyle>
+  <p:extLst>
+    <p:ext uri="{EFAFB233-063F-42B5-8137-9DF3F51BA10A}">
+      <p15:sldGuideLst xmlns:p15="http://schemas.microsoft.com/office/powerpoint/2012/main"/>
+    </p:ext>
+  </p:extLst>
 </p:presentation>
 </file>
 
@@ -354,7 +359,7 @@
           <a:p>
             <a:fld id="{ED291B17-9318-49DB-B28B-6E5994AE9581}" type="datetime1">
               <a:rPr lang="en-US" smtClean="0"/>
-              <a:t>11/21/2019</a:t>
+              <a:t>11/23/2019</a:t>
             </a:fld>
             <a:endParaRPr lang="en-US" dirty="0"/>
           </a:p>
@@ -557,7 +562,7 @@
           <a:p>
             <a:fld id="{2CED4963-E985-44C4-B8C4-FDD613B7C2F8}" type="datetime1">
               <a:rPr lang="en-US" smtClean="0"/>
-              <a:t>11/21/2019</a:t>
+              <a:t>11/23/2019</a:t>
             </a:fld>
             <a:endParaRPr lang="en-US" dirty="0"/>
           </a:p>
@@ -919,7 +924,7 @@
           <a:p>
             <a:fld id="{ED291B17-9318-49DB-B28B-6E5994AE9581}" type="datetime1">
               <a:rPr lang="en-US" smtClean="0"/>
-              <a:t>11/21/2019</a:t>
+              <a:t>11/23/2019</a:t>
             </a:fld>
             <a:endParaRPr lang="en-US" dirty="0"/>
           </a:p>
@@ -1117,7 +1122,7 @@
           <a:p>
             <a:fld id="{78DD82B9-B8EE-4375-B6FF-88FA6ABB15D9}" type="datetime1">
               <a:rPr lang="en-US" smtClean="0"/>
-              <a:t>11/21/2019</a:t>
+              <a:t>11/23/2019</a:t>
             </a:fld>
             <a:endParaRPr lang="en-US" dirty="0"/>
           </a:p>
@@ -1429,7 +1434,7 @@
           <a:p>
             <a:fld id="{B2497495-0637-405E-AE64-5CC7506D51F5}" type="datetime1">
               <a:rPr lang="en-US" smtClean="0"/>
-              <a:t>11/21/2019</a:t>
+              <a:t>11/23/2019</a:t>
             </a:fld>
             <a:endParaRPr lang="en-US" dirty="0"/>
           </a:p>
@@ -1682,7 +1687,7 @@
           <a:p>
             <a:fld id="{7BFFD690-9426-415D-8B65-26881E07B2D4}" type="datetime1">
               <a:rPr lang="en-US" smtClean="0"/>
-              <a:t>11/21/2019</a:t>
+              <a:t>11/23/2019</a:t>
             </a:fld>
             <a:endParaRPr lang="en-US" dirty="0"/>
           </a:p>
@@ -2104,7 +2109,7 @@
           <a:p>
             <a:fld id="{04C4989A-474C-40DE-95B9-011C28B71673}" type="datetime1">
               <a:rPr lang="en-US" smtClean="0"/>
-              <a:t>11/21/2019</a:t>
+              <a:t>11/23/2019</a:t>
             </a:fld>
             <a:endParaRPr lang="en-US" dirty="0"/>
           </a:p>
@@ -2227,7 +2232,7 @@
           <a:p>
             <a:fld id="{5DB4ED54-5B5E-4A04-93D3-5772E3CE3818}" type="datetime1">
               <a:rPr lang="en-US" smtClean="0"/>
-              <a:t>11/21/2019</a:t>
+              <a:t>11/23/2019</a:t>
             </a:fld>
             <a:endParaRPr lang="en-US" dirty="0"/>
           </a:p>
@@ -2322,7 +2327,7 @@
           <a:p>
             <a:fld id="{4EDE50D6-574B-40AF-946F-D52A04ADE379}" type="datetime1">
               <a:rPr lang="en-US" smtClean="0"/>
-              <a:t>11/21/2019</a:t>
+              <a:t>11/23/2019</a:t>
             </a:fld>
             <a:endParaRPr lang="en-US" dirty="0"/>
           </a:p>
@@ -2699,7 +2704,7 @@
           <a:p>
             <a:fld id="{D82884F1-FFEA-405F-9602-3DCA865EDA4E}" type="datetime1">
               <a:rPr lang="en-US" smtClean="0"/>
-              <a:t>11/21/2019</a:t>
+              <a:t>11/23/2019</a:t>
             </a:fld>
             <a:endParaRPr lang="en-US" dirty="0"/>
           </a:p>
@@ -2992,7 +2997,7 @@
           <a:p>
             <a:fld id="{7E18DB4A-8810-4A10-AD5C-D5E2C667F5B3}" type="datetime1">
               <a:rPr lang="en-US" smtClean="0"/>
-              <a:t>11/21/2019</a:t>
+              <a:t>11/23/2019</a:t>
             </a:fld>
             <a:endParaRPr lang="en-US" dirty="0"/>
           </a:p>
@@ -3207,7 +3212,7 @@
           <a:p>
             <a:fld id="{ED291B17-9318-49DB-B28B-6E5994AE9581}" type="datetime1">
               <a:rPr lang="en-US" smtClean="0"/>
-              <a:t>11/21/2019</a:t>
+              <a:t>11/23/2019</a:t>
             </a:fld>
             <a:endParaRPr lang="en-US" dirty="0"/>
           </a:p>
@@ -4253,14 +4258,14 @@
             <p:ph idx="1"/>
             <p:extLst>
               <p:ext uri="{D42A27DB-BD31-4B8C-83A1-F6EECF244321}">
-                <p14:modId xmlns:p14="http://schemas.microsoft.com/office/powerpoint/2010/main" val="526797049"/>
+                <p14:modId xmlns:p14="http://schemas.microsoft.com/office/powerpoint/2010/main" val="4125527901"/>
               </p:ext>
             </p:extLst>
           </p:nvPr>
         </p:nvGraphicFramePr>
         <p:xfrm>
           <a:off x="581025" y="2341563"/>
-          <a:ext cx="11029950" cy="2392680"/>
+          <a:ext cx="11029950" cy="2763520"/>
         </p:xfrm>
         <a:graphic>
           <a:graphicData uri="http://schemas.openxmlformats.org/drawingml/2006/table">
@@ -4517,6 +4522,41 @@
                   </a:ext>
                 </a:extLst>
               </a:tr>
+              <a:tr h="370840">
+                <a:tc>
+                  <a:txBody>
+                    <a:bodyPr/>
+                    <a:lstStyle/>
+                    <a:p>
+                      <a:r>
+                        <a:rPr lang="hu-HU" dirty="0"/>
+                        <a:t>Mélyháló</a:t>
+                      </a:r>
+                      <a:endParaRPr lang="en-US" dirty="0"/>
+                    </a:p>
+                  </a:txBody>
+                  <a:tcPr/>
+                </a:tc>
+                <a:tc>
+                  <a:txBody>
+                    <a:bodyPr/>
+                    <a:lstStyle/>
+                    <a:p>
+                      <a:r>
+                        <a:rPr lang="hu-HU" dirty="0"/>
+                        <a:t>98%</a:t>
+                      </a:r>
+                      <a:endParaRPr lang="en-US" dirty="0"/>
+                    </a:p>
+                  </a:txBody>
+                  <a:tcPr/>
+                </a:tc>
+                <a:extLst>
+                  <a:ext uri="{0D108BD9-81ED-4DB2-BD59-A6C34878D82A}">
+                    <a16:rowId xmlns:a16="http://schemas.microsoft.com/office/drawing/2014/main" val="4143159796"/>
+                  </a:ext>
+                </a:extLst>
+              </a:tr>
             </a:tbl>
           </a:graphicData>
         </a:graphic>
@@ -4574,34 +4614,224 @@
           <a:p>
             <a:r>
               <a:rPr lang="hu-HU" dirty="0"/>
-              <a:t>Képek feldolgozása-mélyháló</a:t>
-            </a:r>
-            <a:endParaRPr lang="en-US" dirty="0"/>
-          </a:p>
-        </p:txBody>
-      </p:sp>
-      <p:sp>
-        <p:nvSpPr>
-          <p:cNvPr id="3" name="Tartalom helye 2">
+              <a:t>Képek feldolgozása</a:t>
+            </a:r>
+            <a:endParaRPr lang="en-US" dirty="0"/>
+          </a:p>
+        </p:txBody>
+      </p:sp>
+      <p:pic>
+        <p:nvPicPr>
+          <p:cNvPr id="5" name="Tartalom helye 4" descr="A képen személy, nő, tartás, kéz látható&#10;&#10;Automatikusan generált leírás">
             <a:extLst>
               <a:ext uri="{FF2B5EF4-FFF2-40B4-BE49-F238E27FC236}">
-                <a16:creationId xmlns:a16="http://schemas.microsoft.com/office/drawing/2014/main" id="{99FACD32-A0F8-4D34-801E-73DDC0B1C5E9}"/>
+                <a16:creationId xmlns:a16="http://schemas.microsoft.com/office/drawing/2014/main" id="{72244667-F17C-494F-9A74-59EA97A4B9A5}"/>
               </a:ext>
             </a:extLst>
           </p:cNvPr>
-          <p:cNvSpPr>
-            <a:spLocks noGrp="1"/>
-          </p:cNvSpPr>
+          <p:cNvPicPr>
+            <a:picLocks noGrp="1" noChangeAspect="1"/>
+          </p:cNvPicPr>
           <p:nvPr>
             <p:ph idx="1"/>
           </p:nvPr>
-        </p:nvSpPr>
-        <p:spPr/>
-        <p:txBody>
-          <a:bodyPr/>
-          <a:lstStyle/>
-          <a:p>
-            <a:endParaRPr lang="en-US"/>
+        </p:nvPicPr>
+        <p:blipFill>
+          <a:blip r:embed="rId2">
+            <a:extLst>
+              <a:ext uri="{28A0092B-C50C-407E-A947-70E740481C1C}">
+                <a14:useLocalDpi xmlns:a14="http://schemas.microsoft.com/office/drawing/2010/main" val="0"/>
+              </a:ext>
+            </a:extLst>
+          </a:blip>
+          <a:stretch>
+            <a:fillRect/>
+          </a:stretch>
+        </p:blipFill>
+        <p:spPr>
+          <a:xfrm>
+            <a:off x="581192" y="2000250"/>
+            <a:ext cx="2857500" cy="2857500"/>
+          </a:xfrm>
+        </p:spPr>
+      </p:pic>
+      <p:pic>
+        <p:nvPicPr>
+          <p:cNvPr id="7" name="Kép 6">
+            <a:extLst>
+              <a:ext uri="{FF2B5EF4-FFF2-40B4-BE49-F238E27FC236}">
+                <a16:creationId xmlns:a16="http://schemas.microsoft.com/office/drawing/2014/main" id="{C71BE211-5B8D-45D4-AAE2-BBAEABCFE930}"/>
+              </a:ext>
+            </a:extLst>
+          </p:cNvPr>
+          <p:cNvPicPr>
+            <a:picLocks noChangeAspect="1"/>
+          </p:cNvPicPr>
+          <p:nvPr/>
+        </p:nvPicPr>
+        <p:blipFill>
+          <a:blip r:embed="rId3">
+            <a:extLst>
+              <a:ext uri="{28A0092B-C50C-407E-A947-70E740481C1C}">
+                <a14:useLocalDpi xmlns:a14="http://schemas.microsoft.com/office/drawing/2010/main" val="0"/>
+              </a:ext>
+            </a:extLst>
+          </a:blip>
+          <a:stretch>
+            <a:fillRect/>
+          </a:stretch>
+        </p:blipFill>
+        <p:spPr>
+          <a:xfrm>
+            <a:off x="4451119" y="2000250"/>
+            <a:ext cx="2857500" cy="2857500"/>
+          </a:xfrm>
+          <a:prstGeom prst="rect">
+            <a:avLst/>
+          </a:prstGeom>
+        </p:spPr>
+      </p:pic>
+      <p:pic>
+        <p:nvPicPr>
+          <p:cNvPr id="9" name="Kép 8">
+            <a:extLst>
+              <a:ext uri="{FF2B5EF4-FFF2-40B4-BE49-F238E27FC236}">
+                <a16:creationId xmlns:a16="http://schemas.microsoft.com/office/drawing/2014/main" id="{5FC89242-7784-4660-B9E7-AAEC14FE77E4}"/>
+              </a:ext>
+            </a:extLst>
+          </p:cNvPr>
+          <p:cNvPicPr>
+            <a:picLocks noChangeAspect="1"/>
+          </p:cNvPicPr>
+          <p:nvPr/>
+        </p:nvPicPr>
+        <p:blipFill>
+          <a:blip r:embed="rId4">
+            <a:extLst>
+              <a:ext uri="{28A0092B-C50C-407E-A947-70E740481C1C}">
+                <a14:useLocalDpi xmlns:a14="http://schemas.microsoft.com/office/drawing/2010/main" val="0"/>
+              </a:ext>
+            </a:extLst>
+          </a:blip>
+          <a:stretch>
+            <a:fillRect/>
+          </a:stretch>
+        </p:blipFill>
+        <p:spPr>
+          <a:xfrm>
+            <a:off x="8321046" y="2000250"/>
+            <a:ext cx="2857500" cy="2857500"/>
+          </a:xfrm>
+          <a:prstGeom prst="rect">
+            <a:avLst/>
+          </a:prstGeom>
+        </p:spPr>
+      </p:pic>
+      <p:sp>
+        <p:nvSpPr>
+          <p:cNvPr id="10" name="Szövegdoboz 9">
+            <a:extLst>
+              <a:ext uri="{FF2B5EF4-FFF2-40B4-BE49-F238E27FC236}">
+                <a16:creationId xmlns:a16="http://schemas.microsoft.com/office/drawing/2014/main" id="{8454562F-105C-4D10-A1DF-308C184165EA}"/>
+              </a:ext>
+            </a:extLst>
+          </p:cNvPr>
+          <p:cNvSpPr txBox="1"/>
+          <p:nvPr/>
+        </p:nvSpPr>
+        <p:spPr>
+          <a:xfrm>
+            <a:off x="786063" y="4972871"/>
+            <a:ext cx="2558716" cy="369332"/>
+          </a:xfrm>
+          <a:prstGeom prst="rect">
+            <a:avLst/>
+          </a:prstGeom>
+          <a:noFill/>
+        </p:spPr>
+        <p:txBody>
+          <a:bodyPr wrap="square" rtlCol="0">
+            <a:spAutoFit/>
+          </a:bodyPr>
+          <a:lstStyle/>
+          <a:p>
+            <a:pPr algn="ctr"/>
+            <a:r>
+              <a:rPr lang="hu-HU" dirty="0"/>
+              <a:t>Az eredeti kép</a:t>
+            </a:r>
+          </a:p>
+        </p:txBody>
+      </p:sp>
+      <p:sp>
+        <p:nvSpPr>
+          <p:cNvPr id="11" name="Szövegdoboz 10">
+            <a:extLst>
+              <a:ext uri="{FF2B5EF4-FFF2-40B4-BE49-F238E27FC236}">
+                <a16:creationId xmlns:a16="http://schemas.microsoft.com/office/drawing/2014/main" id="{CFACCD96-6B95-4431-9C3F-0259C3A2C7D8}"/>
+              </a:ext>
+            </a:extLst>
+          </p:cNvPr>
+          <p:cNvSpPr txBox="1"/>
+          <p:nvPr/>
+        </p:nvSpPr>
+        <p:spPr>
+          <a:xfrm>
+            <a:off x="4600511" y="4967124"/>
+            <a:ext cx="2558716" cy="646331"/>
+          </a:xfrm>
+          <a:prstGeom prst="rect">
+            <a:avLst/>
+          </a:prstGeom>
+          <a:noFill/>
+        </p:spPr>
+        <p:txBody>
+          <a:bodyPr wrap="square" rtlCol="0">
+            <a:spAutoFit/>
+          </a:bodyPr>
+          <a:lstStyle/>
+          <a:p>
+            <a:pPr algn="ctr"/>
+            <a:r>
+              <a:rPr lang="hu-HU" dirty="0"/>
+              <a:t>Szürkében 3x3-mas szűréssel</a:t>
+            </a:r>
+          </a:p>
+        </p:txBody>
+      </p:sp>
+      <p:sp>
+        <p:nvSpPr>
+          <p:cNvPr id="12" name="Szövegdoboz 11">
+            <a:extLst>
+              <a:ext uri="{FF2B5EF4-FFF2-40B4-BE49-F238E27FC236}">
+                <a16:creationId xmlns:a16="http://schemas.microsoft.com/office/drawing/2014/main" id="{D139C884-1D64-426F-9405-DF28FC707914}"/>
+              </a:ext>
+            </a:extLst>
+          </p:cNvPr>
+          <p:cNvSpPr txBox="1"/>
+          <p:nvPr/>
+        </p:nvSpPr>
+        <p:spPr>
+          <a:xfrm>
+            <a:off x="8470438" y="4967124"/>
+            <a:ext cx="2558716" cy="369332"/>
+          </a:xfrm>
+          <a:prstGeom prst="rect">
+            <a:avLst/>
+          </a:prstGeom>
+          <a:noFill/>
+        </p:spPr>
+        <p:txBody>
+          <a:bodyPr wrap="square" rtlCol="0">
+            <a:spAutoFit/>
+          </a:bodyPr>
+          <a:lstStyle/>
+          <a:p>
+            <a:pPr algn="ctr"/>
+            <a:r>
+              <a:rPr lang="hu-HU" dirty="0"/>
+              <a:t>Morfológiai szűrés után</a:t>
+            </a:r>
           </a:p>
         </p:txBody>
       </p:sp>
@@ -4640,7 +4870,7 @@
           <p:cNvPr id="2" name="Cím 1">
             <a:extLst>
               <a:ext uri="{FF2B5EF4-FFF2-40B4-BE49-F238E27FC236}">
-                <a16:creationId xmlns:a16="http://schemas.microsoft.com/office/drawing/2014/main" id="{045AC877-8EC6-43EA-80C8-BE889618636B}"/>
+                <a16:creationId xmlns:a16="http://schemas.microsoft.com/office/drawing/2014/main" id="{15D661B7-69AC-41E5-9B53-E7BD35B130CE}"/>
               </a:ext>
             </a:extLst>
           </p:cNvPr>
@@ -4651,16 +4881,24 @@
             <p:ph type="title"/>
           </p:nvPr>
         </p:nvSpPr>
-        <p:spPr/>
+        <p:spPr>
+          <a:xfrm>
+            <a:off x="581192" y="702156"/>
+            <a:ext cx="11029616" cy="1188720"/>
+          </a:xfrm>
+        </p:spPr>
         <p:txBody>
           <a:bodyPr/>
           <a:lstStyle/>
           <a:p>
             <a:r>
+              <a:rPr lang="hu-HU" dirty="0" err="1"/>
+              <a:t>FelHasznált</a:t>
+            </a:r>
+            <a:r>
               <a:rPr lang="hu-HU" dirty="0"/>
-              <a:t>Képek feldolgozása-általános</a:t>
-            </a:r>
-            <a:endParaRPr lang="en-US" dirty="0"/>
+              <a:t> tulajdonságok</a:t>
+            </a:r>
           </a:p>
         </p:txBody>
       </p:sp>
@@ -4669,7 +4907,7 @@
           <p:cNvPr id="3" name="Tartalom helye 2">
             <a:extLst>
               <a:ext uri="{FF2B5EF4-FFF2-40B4-BE49-F238E27FC236}">
-                <a16:creationId xmlns:a16="http://schemas.microsoft.com/office/drawing/2014/main" id="{ADC106EC-8CF5-4AF1-A4BF-657BD7505AC5}"/>
+                <a16:creationId xmlns:a16="http://schemas.microsoft.com/office/drawing/2014/main" id="{17559F84-DD82-45A6-A32E-2FEF9D181625}"/>
               </a:ext>
             </a:extLst>
           </p:cNvPr>
@@ -4685,14 +4923,44 @@
           <a:bodyPr/>
           <a:lstStyle/>
           <a:p>
-            <a:endParaRPr lang="en-US"/>
+            <a:r>
+              <a:rPr lang="hu-HU" dirty="0"/>
+              <a:t>Excentricitás: mennyire kör alakú az alakzat</a:t>
+            </a:r>
+          </a:p>
+          <a:p>
+            <a:r>
+              <a:rPr lang="hu-HU" dirty="0"/>
+              <a:t>Kerület</a:t>
+            </a:r>
+          </a:p>
+          <a:p>
+            <a:r>
+              <a:rPr lang="hu-HU" dirty="0"/>
+              <a:t>Súlypont (x, y) koordinátája</a:t>
+            </a:r>
+          </a:p>
+          <a:p>
+            <a:r>
+              <a:rPr lang="hu-HU" dirty="0"/>
+              <a:t>Kiterjedés: alakzat területe / az őt befoglaló téglalap területe</a:t>
+            </a:r>
+          </a:p>
+          <a:p>
+            <a:r>
+              <a:rPr lang="hu-HU" dirty="0"/>
+              <a:t>Főtengely hossza</a:t>
+            </a:r>
+          </a:p>
+          <a:p>
+            <a:endParaRPr lang="hu-HU" dirty="0"/>
           </a:p>
         </p:txBody>
       </p:sp>
     </p:spTree>
     <p:extLst>
       <p:ext uri="{BB962C8B-B14F-4D97-AF65-F5344CB8AC3E}">
-        <p14:creationId xmlns:p14="http://schemas.microsoft.com/office/powerpoint/2010/main" val="2487736760"/>
+        <p14:creationId xmlns:p14="http://schemas.microsoft.com/office/powerpoint/2010/main" val="2096952834"/>
       </p:ext>
     </p:extLst>
   </p:cSld>

</xml_diff>